<commit_message>
feat: overhaul of GUI w.r.t. debug and output messages
</commit_message>
<xml_diff>
--- a/doc/devdoc/Anforderungen an Fehleranzeige.pptx
+++ b/doc/devdoc/Anforderungen an Fehleranzeige.pptx
@@ -106,6 +106,11 @@
       </a:defRPr>
     </a:lvl9pPr>
   </p:defaultTextStyle>
+  <p:extLst>
+    <p:ext uri="{EFAFB233-063F-42B5-8137-9DF3F51BA10A}">
+      <p15:sldGuideLst xmlns:p15="http://schemas.microsoft.com/office/powerpoint/2012/main"/>
+    </p:ext>
+  </p:extLst>
 </p:presentation>
 </file>
 
@@ -240,7 +245,7 @@
           <a:p>
             <a:fld id="{DF6398AD-6725-4853-A06D-297D0447FE54}" type="datetimeFigureOut">
               <a:rPr lang="de-DE" smtClean="0"/>
-              <a:t>25.04.2022</a:t>
+              <a:t>26.04.2022</a:t>
             </a:fld>
             <a:endParaRPr lang="de-DE" dirty="0"/>
           </a:p>
@@ -410,7 +415,7 @@
           <a:p>
             <a:fld id="{DF6398AD-6725-4853-A06D-297D0447FE54}" type="datetimeFigureOut">
               <a:rPr lang="de-DE" smtClean="0"/>
-              <a:t>25.04.2022</a:t>
+              <a:t>26.04.2022</a:t>
             </a:fld>
             <a:endParaRPr lang="de-DE" dirty="0"/>
           </a:p>
@@ -590,7 +595,7 @@
           <a:p>
             <a:fld id="{DF6398AD-6725-4853-A06D-297D0447FE54}" type="datetimeFigureOut">
               <a:rPr lang="de-DE" smtClean="0"/>
-              <a:t>25.04.2022</a:t>
+              <a:t>26.04.2022</a:t>
             </a:fld>
             <a:endParaRPr lang="de-DE" dirty="0"/>
           </a:p>
@@ -760,7 +765,7 @@
           <a:p>
             <a:fld id="{DF6398AD-6725-4853-A06D-297D0447FE54}" type="datetimeFigureOut">
               <a:rPr lang="de-DE" smtClean="0"/>
-              <a:t>25.04.2022</a:t>
+              <a:t>26.04.2022</a:t>
             </a:fld>
             <a:endParaRPr lang="de-DE" dirty="0"/>
           </a:p>
@@ -1006,7 +1011,7 @@
           <a:p>
             <a:fld id="{DF6398AD-6725-4853-A06D-297D0447FE54}" type="datetimeFigureOut">
               <a:rPr lang="de-DE" smtClean="0"/>
-              <a:t>25.04.2022</a:t>
+              <a:t>26.04.2022</a:t>
             </a:fld>
             <a:endParaRPr lang="de-DE" dirty="0"/>
           </a:p>
@@ -1238,7 +1243,7 @@
           <a:p>
             <a:fld id="{DF6398AD-6725-4853-A06D-297D0447FE54}" type="datetimeFigureOut">
               <a:rPr lang="de-DE" smtClean="0"/>
-              <a:t>25.04.2022</a:t>
+              <a:t>26.04.2022</a:t>
             </a:fld>
             <a:endParaRPr lang="de-DE" dirty="0"/>
           </a:p>
@@ -1605,7 +1610,7 @@
           <a:p>
             <a:fld id="{DF6398AD-6725-4853-A06D-297D0447FE54}" type="datetimeFigureOut">
               <a:rPr lang="de-DE" smtClean="0"/>
-              <a:t>25.04.2022</a:t>
+              <a:t>26.04.2022</a:t>
             </a:fld>
             <a:endParaRPr lang="de-DE" dirty="0"/>
           </a:p>
@@ -1723,7 +1728,7 @@
           <a:p>
             <a:fld id="{DF6398AD-6725-4853-A06D-297D0447FE54}" type="datetimeFigureOut">
               <a:rPr lang="de-DE" smtClean="0"/>
-              <a:t>25.04.2022</a:t>
+              <a:t>26.04.2022</a:t>
             </a:fld>
             <a:endParaRPr lang="de-DE" dirty="0"/>
           </a:p>
@@ -1818,7 +1823,7 @@
           <a:p>
             <a:fld id="{DF6398AD-6725-4853-A06D-297D0447FE54}" type="datetimeFigureOut">
               <a:rPr lang="de-DE" smtClean="0"/>
-              <a:t>25.04.2022</a:t>
+              <a:t>26.04.2022</a:t>
             </a:fld>
             <a:endParaRPr lang="de-DE" dirty="0"/>
           </a:p>
@@ -2095,7 +2100,7 @@
           <a:p>
             <a:fld id="{DF6398AD-6725-4853-A06D-297D0447FE54}" type="datetimeFigureOut">
               <a:rPr lang="de-DE" smtClean="0"/>
-              <a:t>25.04.2022</a:t>
+              <a:t>26.04.2022</a:t>
             </a:fld>
             <a:endParaRPr lang="de-DE" dirty="0"/>
           </a:p>
@@ -2348,7 +2353,7 @@
           <a:p>
             <a:fld id="{DF6398AD-6725-4853-A06D-297D0447FE54}" type="datetimeFigureOut">
               <a:rPr lang="de-DE" smtClean="0"/>
-              <a:t>25.04.2022</a:t>
+              <a:t>26.04.2022</a:t>
             </a:fld>
             <a:endParaRPr lang="de-DE" dirty="0"/>
           </a:p>
@@ -2561,7 +2566,7 @@
           <a:p>
             <a:fld id="{DF6398AD-6725-4853-A06D-297D0447FE54}" type="datetimeFigureOut">
               <a:rPr lang="de-DE" smtClean="0"/>
-              <a:t>25.04.2022</a:t>
+              <a:t>26.04.2022</a:t>
             </a:fld>
             <a:endParaRPr lang="de-DE" dirty="0"/>
           </a:p>
@@ -3010,72 +3015,39 @@
           <a:p>
             <a:r>
               <a:rPr lang="de-DE" sz="1800" dirty="0" smtClean="0"/>
-              <a:t>Globales DEBUG </a:t>
-            </a:r>
+              <a:t>Globales DEBUG setting</a:t>
+            </a:r>
+            <a:endParaRPr lang="de-DE" sz="1800" dirty="0"/>
+          </a:p>
+          <a:p>
             <a:r>
               <a:rPr lang="de-DE" sz="1800" dirty="0" smtClean="0"/>
-              <a:t>setting</a:t>
-            </a:r>
+              <a:t>Wann wird was angeziegt?</a:t>
+            </a:r>
+          </a:p>
+          <a:p>
             <a:endParaRPr lang="de-DE" sz="1800" dirty="0"/>
           </a:p>
           <a:p>
+            <a:endParaRPr lang="de-DE" sz="1800" dirty="0" smtClean="0"/>
+          </a:p>
+          <a:p>
+            <a:endParaRPr lang="de-DE" sz="1800" dirty="0"/>
+          </a:p>
+          <a:p>
+            <a:endParaRPr lang="de-DE" sz="1800" dirty="0" smtClean="0"/>
+          </a:p>
+          <a:p>
             <a:r>
               <a:rPr lang="de-DE" sz="1800" dirty="0" smtClean="0"/>
-              <a:t>Wann wird was </a:t>
-            </a:r>
+              <a:t>Fehler in logger mit entsprechendem Level</a:t>
+            </a:r>
+          </a:p>
+          <a:p>
             <a:r>
               <a:rPr lang="de-DE" sz="1800" dirty="0" smtClean="0"/>
-              <a:t>angeziegt</a:t>
-            </a:r>
-            <a:r>
-              <a:rPr lang="de-DE" sz="1800" dirty="0" smtClean="0"/>
-              <a:t>?</a:t>
-            </a:r>
-          </a:p>
-          <a:p>
-            <a:endParaRPr lang="de-DE" sz="1800" dirty="0"/>
-          </a:p>
-          <a:p>
-            <a:endParaRPr lang="de-DE" sz="1800" dirty="0" smtClean="0"/>
-          </a:p>
-          <a:p>
-            <a:endParaRPr lang="de-DE" sz="1800" dirty="0"/>
-          </a:p>
-          <a:p>
-            <a:endParaRPr lang="de-DE" sz="1800" dirty="0" smtClean="0"/>
-          </a:p>
-          <a:p>
-            <a:r>
-              <a:rPr lang="de-DE" sz="1800" dirty="0" smtClean="0"/>
-              <a:t>Fehler in </a:t>
-            </a:r>
-            <a:r>
-              <a:rPr lang="de-DE" sz="1800" dirty="0" smtClean="0"/>
-              <a:t>logger</a:t>
-            </a:r>
-            <a:r>
-              <a:rPr lang="de-DE" sz="1800" dirty="0" smtClean="0"/>
-              <a:t> mit entsprechendem Level</a:t>
-            </a:r>
-          </a:p>
-          <a:p>
-            <a:r>
-              <a:rPr lang="de-DE" sz="1800" dirty="0" smtClean="0"/>
-              <a:t>Möglichst nichts auf stdout -&gt; reserviert für </a:t>
-            </a:r>
-            <a:r>
-              <a:rPr lang="de-DE" sz="1800" dirty="0" smtClean="0"/>
-              <a:t>gui</a:t>
-            </a:r>
-            <a:r>
-              <a:rPr lang="de-DE" sz="1800" dirty="0" smtClean="0"/>
-              <a:t> </a:t>
-            </a:r>
-            <a:r>
-              <a:rPr lang="de-DE" sz="1800" dirty="0" smtClean="0"/>
-              <a:t>infos</a:t>
-            </a:r>
-            <a:endParaRPr lang="de-DE" sz="1800" dirty="0" smtClean="0"/>
+              <a:t>Möglichst nichts auf stdout -&gt; reserviert für gui infos</a:t>
+            </a:r>
           </a:p>
         </p:txBody>
       </p:sp>
@@ -4059,7 +4031,6 @@
               <a:rPr lang="de-DE" dirty="0" smtClean="0"/>
               <a:t>Cmd</a:t>
             </a:r>
-            <a:endParaRPr lang="de-DE" dirty="0" smtClean="0"/>
           </a:p>
         </p:txBody>
       </p:sp>
@@ -4187,11 +4158,7 @@
             <a:pPr algn="ctr"/>
             <a:r>
               <a:rPr lang="de-DE" dirty="0" smtClean="0"/>
-              <a:t>Ausgabe von </a:t>
-            </a:r>
-            <a:r>
-              <a:rPr lang="de-DE" dirty="0" smtClean="0"/>
-              <a:t>logger</a:t>
+              <a:t>Ausgabe von logger</a:t>
             </a:r>
             <a:endParaRPr lang="de-DE" dirty="0"/>
           </a:p>
@@ -4334,23 +4301,7 @@
           <a:p>
             <a:r>
               <a:rPr lang="de-DE" dirty="0" smtClean="0"/>
-              <a:t>Hier darf keine </a:t>
-            </a:r>
-            <a:r>
-              <a:rPr lang="de-DE" dirty="0" smtClean="0"/>
-              <a:t>error</a:t>
-            </a:r>
-            <a:r>
-              <a:rPr lang="de-DE" dirty="0" smtClean="0"/>
-              <a:t> </a:t>
-            </a:r>
-            <a:r>
-              <a:rPr lang="de-DE" dirty="0" smtClean="0"/>
-              <a:t>msg</a:t>
-            </a:r>
-            <a:r>
-              <a:rPr lang="de-DE" dirty="0" smtClean="0"/>
-              <a:t> auf stdout stehen</a:t>
+              <a:t>Hier darf keine error msg auf stdout stehen</a:t>
             </a:r>
             <a:endParaRPr lang="de-DE" dirty="0"/>
           </a:p>
@@ -4504,15 +4455,7 @@
           <a:p>
             <a:r>
               <a:rPr lang="de-DE" dirty="0" smtClean="0"/>
-              <a:t>Hier kann </a:t>
-            </a:r>
-            <a:r>
-              <a:rPr lang="de-DE" dirty="0" smtClean="0"/>
-              <a:t>error</a:t>
-            </a:r>
-            <a:r>
-              <a:rPr lang="de-DE" dirty="0" smtClean="0"/>
-              <a:t> auf stdout stehen</a:t>
+              <a:t>Hier kann error auf stdout stehen</a:t>
             </a:r>
             <a:endParaRPr lang="de-DE" dirty="0"/>
           </a:p>
@@ -4761,19 +4704,7 @@
             <a:pPr algn="ctr"/>
             <a:r>
               <a:rPr lang="de-DE" sz="1400" dirty="0" smtClean="0"/>
-              <a:t>Subprocess</a:t>
-            </a:r>
-            <a:r>
-              <a:rPr lang="de-DE" sz="1400" dirty="0" smtClean="0"/>
-              <a:t> schreibt </a:t>
-            </a:r>
-            <a:r>
-              <a:rPr lang="de-DE" sz="1400" dirty="0" smtClean="0"/>
-              <a:t>error</a:t>
-            </a:r>
-            <a:r>
-              <a:rPr lang="de-DE" sz="1400" dirty="0" smtClean="0"/>
-              <a:t> auf stdout</a:t>
+              <a:t>Subprocess schreibt error auf stdout</a:t>
             </a:r>
             <a:r>
               <a:rPr lang="de-DE" sz="1400" dirty="0"/>
@@ -4904,27 +4835,13 @@
           <a:p>
             <a:r>
               <a:rPr lang="de-DE" sz="1800" dirty="0" smtClean="0"/>
-              <a:t>Warum stehen </a:t>
-            </a:r>
+              <a:t>Warum stehen error messages nicht auf stderr?</a:t>
+            </a:r>
+          </a:p>
+          <a:p>
             <a:r>
               <a:rPr lang="de-DE" sz="1800" dirty="0" smtClean="0"/>
-              <a:t>error</a:t>
-            </a:r>
-            <a:r>
-              <a:rPr lang="de-DE" sz="1800" dirty="0" smtClean="0"/>
-              <a:t> </a:t>
-            </a:r>
-            <a:r>
-              <a:rPr lang="de-DE" sz="1800" dirty="0" smtClean="0"/>
-              <a:t>messages</a:t>
-            </a:r>
-            <a:r>
-              <a:rPr lang="de-DE" sz="1800" dirty="0" smtClean="0"/>
-              <a:t> nicht auf </a:t>
-            </a:r>
-            <a:r>
-              <a:rPr lang="de-DE" sz="1800" dirty="0" smtClean="0"/>
-              <a:t>stderr</a:t>
+              <a:t>Wie vermeiden, dass subprocess auf stdout schreibt, ohne dabei output von ackrep_data zu verlieren</a:t>
             </a:r>
             <a:r>
               <a:rPr lang="de-DE" sz="1800" dirty="0" smtClean="0"/>
@@ -4934,31 +4851,31 @@
           <a:p>
             <a:r>
               <a:rPr lang="de-DE" sz="1800" dirty="0" smtClean="0"/>
-              <a:t>Wie vermeiden, dass </a:t>
+              <a:t>Bei Fehler, was soll in GUI angezeigt/ nicht mehr angezeigt werden (</a:t>
+            </a:r>
+            <a:r>
+              <a:rPr lang="de-DE" sz="1800" dirty="0" err="1" smtClean="0"/>
+              <a:t>output</a:t>
             </a:r>
             <a:r>
               <a:rPr lang="de-DE" sz="1800" dirty="0" smtClean="0"/>
-              <a:t>subprocess</a:t>
+              <a:t>, </a:t>
+            </a:r>
+            <a:r>
+              <a:rPr lang="de-DE" sz="1800" dirty="0" err="1" smtClean="0"/>
+              <a:t>plot</a:t>
             </a:r>
             <a:r>
               <a:rPr lang="de-DE" sz="1800" dirty="0" smtClean="0"/>
-              <a:t> auf stdout schreibt, ohne dabei </a:t>
-            </a:r>
-            <a:r>
-              <a:rPr lang="de-DE" sz="1800" dirty="0" smtClean="0"/>
-              <a:t>output</a:t>
-            </a:r>
-            <a:r>
-              <a:rPr lang="de-DE" sz="1800" dirty="0" smtClean="0"/>
-              <a:t> von </a:t>
-            </a:r>
-            <a:r>
-              <a:rPr lang="de-DE" sz="1800" dirty="0" smtClean="0"/>
-              <a:t>ackrep_data</a:t>
-            </a:r>
-            <a:r>
-              <a:rPr lang="de-DE" sz="1800" dirty="0" smtClean="0"/>
-              <a:t> zu verlieren?</a:t>
+              <a:t>, </a:t>
+            </a:r>
+            <a:r>
+              <a:rPr lang="de-DE" sz="1800" dirty="0" err="1" smtClean="0"/>
+              <a:t>pdf</a:t>
+            </a:r>
+            <a:r>
+              <a:rPr lang="de-DE" sz="1800" smtClean="0"/>
+              <a:t>,…)?</a:t>
             </a:r>
             <a:endParaRPr lang="de-DE" sz="1800" dirty="0"/>
           </a:p>

</xml_diff>